<commit_message>
Corrected for TF 2.15 (mask detector)
</commit_message>
<xml_diff>
--- a/Day 1/CV-Blockweek-Administration.pptx
+++ b/Day 1/CV-Blockweek-Administration.pptx
@@ -263,7 +263,7 @@
           <a:p>
             <a:fld id="{16060644-07C5-794D-BED3-01774025CA20}" type="datetimeFigureOut">
               <a:rPr lang="en-CH" smtClean="0"/>
-              <a:t>01.09.2024</a:t>
+              <a:t>02.09.2024</a:t>
             </a:fld>
             <a:endParaRPr lang="en-CH"/>
           </a:p>
@@ -466,7 +466,7 @@
           <a:p>
             <a:fld id="{16060644-07C5-794D-BED3-01774025CA20}" type="datetimeFigureOut">
               <a:rPr lang="en-CH" smtClean="0"/>
-              <a:t>01.09.2024</a:t>
+              <a:t>02.09.2024</a:t>
             </a:fld>
             <a:endParaRPr lang="en-CH"/>
           </a:p>
@@ -676,7 +676,7 @@
           <a:p>
             <a:fld id="{16060644-07C5-794D-BED3-01774025CA20}" type="datetimeFigureOut">
               <a:rPr lang="en-CH" smtClean="0"/>
-              <a:t>01.09.2024</a:t>
+              <a:t>02.09.2024</a:t>
             </a:fld>
             <a:endParaRPr lang="en-CH"/>
           </a:p>
@@ -876,7 +876,7 @@
           <a:p>
             <a:fld id="{16060644-07C5-794D-BED3-01774025CA20}" type="datetimeFigureOut">
               <a:rPr lang="en-CH" smtClean="0"/>
-              <a:t>01.09.2024</a:t>
+              <a:t>02.09.2024</a:t>
             </a:fld>
             <a:endParaRPr lang="en-CH"/>
           </a:p>
@@ -1152,7 +1152,7 @@
           <a:p>
             <a:fld id="{16060644-07C5-794D-BED3-01774025CA20}" type="datetimeFigureOut">
               <a:rPr lang="en-CH" smtClean="0"/>
-              <a:t>01.09.2024</a:t>
+              <a:t>02.09.2024</a:t>
             </a:fld>
             <a:endParaRPr lang="en-CH"/>
           </a:p>
@@ -1423,7 +1423,7 @@
           <a:p>
             <a:fld id="{16060644-07C5-794D-BED3-01774025CA20}" type="datetimeFigureOut">
               <a:rPr lang="en-CH" smtClean="0"/>
-              <a:t>01.09.2024</a:t>
+              <a:t>02.09.2024</a:t>
             </a:fld>
             <a:endParaRPr lang="en-CH"/>
           </a:p>
@@ -1841,7 +1841,7 @@
           <a:p>
             <a:fld id="{16060644-07C5-794D-BED3-01774025CA20}" type="datetimeFigureOut">
               <a:rPr lang="en-CH" smtClean="0"/>
-              <a:t>01.09.2024</a:t>
+              <a:t>02.09.2024</a:t>
             </a:fld>
             <a:endParaRPr lang="en-CH"/>
           </a:p>
@@ -1986,7 +1986,7 @@
           <a:p>
             <a:fld id="{16060644-07C5-794D-BED3-01774025CA20}" type="datetimeFigureOut">
               <a:rPr lang="en-CH" smtClean="0"/>
-              <a:t>01.09.2024</a:t>
+              <a:t>02.09.2024</a:t>
             </a:fld>
             <a:endParaRPr lang="en-CH"/>
           </a:p>
@@ -2102,7 +2102,7 @@
           <a:p>
             <a:fld id="{16060644-07C5-794D-BED3-01774025CA20}" type="datetimeFigureOut">
               <a:rPr lang="en-CH" smtClean="0"/>
-              <a:t>01.09.2024</a:t>
+              <a:t>02.09.2024</a:t>
             </a:fld>
             <a:endParaRPr lang="en-CH"/>
           </a:p>
@@ -2415,7 +2415,7 @@
           <a:p>
             <a:fld id="{16060644-07C5-794D-BED3-01774025CA20}" type="datetimeFigureOut">
               <a:rPr lang="en-CH" smtClean="0"/>
-              <a:t>01.09.2024</a:t>
+              <a:t>02.09.2024</a:t>
             </a:fld>
             <a:endParaRPr lang="en-CH"/>
           </a:p>
@@ -2704,7 +2704,7 @@
           <a:p>
             <a:fld id="{16060644-07C5-794D-BED3-01774025CA20}" type="datetimeFigureOut">
               <a:rPr lang="en-CH" smtClean="0"/>
-              <a:t>01.09.2024</a:t>
+              <a:t>02.09.2024</a:t>
             </a:fld>
             <a:endParaRPr lang="en-CH"/>
           </a:p>
@@ -2949,7 +2949,7 @@
             <a:fld id="{16060644-07C5-794D-BED3-01774025CA20}" type="datetimeFigureOut">
               <a:rPr lang="en-CH" smtClean="0"/>
               <a:pPr/>
-              <a:t>01.09.2024</a:t>
+              <a:t>02.09.2024</a:t>
             </a:fld>
             <a:endParaRPr lang="en-CH" dirty="0"/>
           </a:p>
@@ -3600,14 +3600,10 @@
             </a:r>
             <a:r>
               <a:rPr lang="en-CH" dirty="0"/>
-              <a:t>) – To be uploaded in </a:t>
-            </a:r>
-            <a:r>
-              <a:rPr lang="en-CH"/>
-              <a:t>ILIAS (ILIAS </a:t>
-            </a:r>
-            <a:r>
-              <a:rPr lang="en-CH">
+              <a:t>) – To be uploaded in ILIAS (ILIAS </a:t>
+            </a:r>
+            <a:r>
+              <a:rPr lang="en-CH" dirty="0">
                 <a:hlinkClick r:id="rId2"/>
               </a:rPr>
               <a:t>DOWNLOAD</a:t>
@@ -3627,7 +3623,15 @@
           <a:p>
             <a:r>
               <a:rPr lang="en-CH" dirty="0"/>
-              <a:t>Choice of Project - We suggest to decide on the final project by Wendsday to be able to discuss it with us. Not every project is suitable for this module.</a:t>
+              <a:t>Choice of Project - We suggest to decide on the final project </a:t>
+            </a:r>
+            <a:r>
+              <a:rPr lang="en-CH"/>
+              <a:t>by Wednsday </a:t>
+            </a:r>
+            <a:r>
+              <a:rPr lang="en-CH" dirty="0"/>
+              <a:t>to be able to discuss it with us. Not every project is suitable for this module.</a:t>
             </a:r>
           </a:p>
           <a:p>

</xml_diff>